<commit_message>
477 html versie ka (#480)
* Merge CSS files. Ouput HTML version of Kwaliteitsaanpak.

* Wijzigingsgeschiedenis bijgewerkt.

* Update NEN links.

* Produce HTML output in docs/ for GitHub Pages.
</commit_message>
<xml_diff>
--- a/Content/Images/relaties-tussen-producten.pptx
+++ b/Content/Images/relaties-tussen-producten.pptx
@@ -232,7 +232,7 @@
           <a:p>
             <a:fld id="{350B2457-A054-7D40-BA7B-21B0D0BCC8B3}" type="datetimeFigureOut">
               <a:rPr lang="nl-NL" smtClean="0"/>
-              <a:t>08-01-2021</a:t>
+              <a:t>03-02-2022</a:t>
             </a:fld>
             <a:endParaRPr lang="nl-NL"/>
           </a:p>
@@ -373,7 +373,7 @@
             <a:fld id="{B7EEF894-AF89-4A15-B12A-DB6EE2F8B7F6}" type="datetimeFigureOut">
               <a:rPr lang="nl-NL" smtClean="0"/>
               <a:pPr/>
-              <a:t>08-01-2021</a:t>
+              <a:t>03-02-2022</a:t>
             </a:fld>
             <a:endParaRPr lang="nl-NL"/>
           </a:p>
@@ -3304,6 +3304,12 @@
           <a:prstGeom prst="foldedCorner">
             <a:avLst/>
           </a:prstGeom>
+          <a:solidFill>
+            <a:schemeClr val="accent2">
+              <a:lumMod val="40000"/>
+              <a:lumOff val="60000"/>
+            </a:schemeClr>
+          </a:solidFill>
         </p:spPr>
         <p:style>
           <a:lnRef idx="1">
@@ -3325,7 +3331,11 @@
           <a:p>
             <a:pPr algn="ctr"/>
             <a:r>
-              <a:rPr lang="nl-NL" dirty="0"/>
+              <a:rPr lang="nl-NL" dirty="0">
+                <a:solidFill>
+                  <a:schemeClr val="tx1"/>
+                </a:solidFill>
+              </a:rPr>
               <a:t>PSA</a:t>
             </a:r>
           </a:p>
@@ -3351,6 +3361,12 @@
           <a:prstGeom prst="foldedCorner">
             <a:avLst/>
           </a:prstGeom>
+          <a:solidFill>
+            <a:schemeClr val="accent2">
+              <a:lumMod val="40000"/>
+              <a:lumOff val="60000"/>
+            </a:schemeClr>
+          </a:solidFill>
         </p:spPr>
         <p:style>
           <a:lnRef idx="1">
@@ -3372,7 +3388,11 @@
           <a:p>
             <a:pPr algn="ctr"/>
             <a:r>
-              <a:rPr lang="nl-NL" dirty="0"/>
+              <a:rPr lang="nl-NL" dirty="0">
+                <a:solidFill>
+                  <a:schemeClr val="tx1"/>
+                </a:solidFill>
+              </a:rPr>
               <a:t>BIA</a:t>
             </a:r>
           </a:p>
@@ -3398,6 +3418,12 @@
           <a:prstGeom prst="foldedCorner">
             <a:avLst/>
           </a:prstGeom>
+          <a:solidFill>
+            <a:schemeClr val="accent2">
+              <a:lumMod val="40000"/>
+              <a:lumOff val="60000"/>
+            </a:schemeClr>
+          </a:solidFill>
         </p:spPr>
         <p:style>
           <a:lnRef idx="1">
@@ -3419,7 +3445,11 @@
           <a:p>
             <a:pPr algn="ctr"/>
             <a:r>
-              <a:rPr lang="nl-NL" dirty="0"/>
+              <a:rPr lang="nl-NL" dirty="0">
+                <a:solidFill>
+                  <a:schemeClr val="tx1"/>
+                </a:solidFill>
+              </a:rPr>
               <a:t>PIA</a:t>
             </a:r>
           </a:p>
@@ -3446,7 +3476,10 @@
             <a:avLst/>
           </a:prstGeom>
           <a:solidFill>
-            <a:srgbClr val="FF33C7"/>
+            <a:schemeClr val="accent4">
+              <a:lumMod val="40000"/>
+              <a:lumOff val="60000"/>
+            </a:schemeClr>
           </a:solidFill>
         </p:spPr>
         <p:style>
@@ -3469,7 +3502,11 @@
           <a:p>
             <a:pPr algn="ctr"/>
             <a:r>
-              <a:rPr lang="nl-NL" dirty="0"/>
+              <a:rPr lang="nl-NL" dirty="0">
+                <a:solidFill>
+                  <a:schemeClr val="tx1"/>
+                </a:solidFill>
+              </a:rPr>
               <a:t>FE</a:t>
             </a:r>
           </a:p>
@@ -3539,7 +3576,10 @@
             <a:avLst/>
           </a:prstGeom>
           <a:solidFill>
-            <a:srgbClr val="FF33C7"/>
+            <a:schemeClr val="accent4">
+              <a:lumMod val="40000"/>
+              <a:lumOff val="60000"/>
+            </a:schemeClr>
           </a:solidFill>
         </p:spPr>
         <p:style>
@@ -3562,7 +3602,11 @@
           <a:p>
             <a:pPr algn="ctr"/>
             <a:r>
-              <a:rPr lang="nl-NL" dirty="0"/>
+              <a:rPr lang="nl-NL" dirty="0">
+                <a:solidFill>
+                  <a:schemeClr val="tx1"/>
+                </a:solidFill>
+              </a:rPr>
               <a:t>NFE</a:t>
             </a:r>
           </a:p>
@@ -3718,7 +3762,10 @@
             <a:avLst/>
           </a:prstGeom>
           <a:solidFill>
-            <a:srgbClr val="FF33C7"/>
+            <a:schemeClr val="accent4">
+              <a:lumMod val="40000"/>
+              <a:lumOff val="60000"/>
+            </a:schemeClr>
           </a:solidFill>
         </p:spPr>
         <p:style>
@@ -3741,7 +3788,11 @@
           <a:p>
             <a:pPr algn="ctr"/>
             <a:r>
-              <a:rPr lang="nl-NL" dirty="0"/>
+              <a:rPr lang="nl-NL" dirty="0">
+                <a:solidFill>
+                  <a:schemeClr val="tx1"/>
+                </a:solidFill>
+              </a:rPr>
               <a:t>BL</a:t>
             </a:r>
           </a:p>
@@ -3854,7 +3905,10 @@
             <a:avLst/>
           </a:prstGeom>
           <a:solidFill>
-            <a:srgbClr val="FF33C7"/>
+            <a:schemeClr val="accent4">
+              <a:lumMod val="40000"/>
+              <a:lumOff val="60000"/>
+            </a:schemeClr>
           </a:solidFill>
         </p:spPr>
         <p:style>
@@ -3877,7 +3931,11 @@
           <a:p>
             <a:pPr algn="ctr"/>
             <a:r>
-              <a:rPr lang="nl-NL" dirty="0"/>
+              <a:rPr lang="nl-NL" dirty="0">
+                <a:solidFill>
+                  <a:schemeClr val="tx1"/>
+                </a:solidFill>
+              </a:rPr>
               <a:t>O&amp;A</a:t>
             </a:r>
           </a:p>
@@ -3990,7 +4048,10 @@
             <a:avLst/>
           </a:prstGeom>
           <a:solidFill>
-            <a:srgbClr val="FF33C7"/>
+            <a:schemeClr val="accent4">
+              <a:lumMod val="40000"/>
+              <a:lumOff val="60000"/>
+            </a:schemeClr>
           </a:solidFill>
           <a:ln>
             <a:round/>
@@ -4016,8 +4077,12 @@
           <a:p>
             <a:pPr algn="ctr"/>
             <a:r>
-              <a:rPr lang="nl-NL" dirty="0"/>
-              <a:t>Test</a:t>
+              <a:rPr lang="nl-NL" dirty="0">
+                <a:solidFill>
+                  <a:schemeClr val="tx1"/>
+                </a:solidFill>
+              </a:rPr>
+              <a:t>TP</a:t>
             </a:r>
           </a:p>
         </p:txBody>
@@ -4129,7 +4194,10 @@
             <a:avLst/>
           </a:prstGeom>
           <a:solidFill>
-            <a:srgbClr val="FF33C7"/>
+            <a:schemeClr val="accent4">
+              <a:lumMod val="40000"/>
+              <a:lumOff val="60000"/>
+            </a:schemeClr>
           </a:solidFill>
         </p:spPr>
         <p:style>
@@ -4152,7 +4220,11 @@
           <a:p>
             <a:pPr algn="ctr"/>
             <a:r>
-              <a:rPr lang="nl-NL" dirty="0"/>
+              <a:rPr lang="nl-NL" dirty="0">
+                <a:solidFill>
+                  <a:schemeClr val="tx1"/>
+                </a:solidFill>
+              </a:rPr>
               <a:t>IB</a:t>
             </a:r>
           </a:p>
@@ -4308,7 +4380,10 @@
             <a:avLst/>
           </a:prstGeom>
           <a:solidFill>
-            <a:srgbClr val="FF33C7"/>
+            <a:schemeClr val="accent4">
+              <a:lumMod val="40000"/>
+              <a:lumOff val="60000"/>
+            </a:schemeClr>
           </a:solidFill>
         </p:spPr>
         <p:style>
@@ -4331,7 +4406,11 @@
           <a:p>
             <a:pPr algn="ctr"/>
             <a:r>
-              <a:rPr lang="nl-NL" dirty="0"/>
+              <a:rPr lang="nl-NL" dirty="0">
+                <a:solidFill>
+                  <a:schemeClr val="tx1"/>
+                </a:solidFill>
+              </a:rPr>
               <a:t>KP</a:t>
             </a:r>
           </a:p>
@@ -4395,7 +4474,7 @@
         <p:spPr>
           <a:xfrm>
             <a:off x="4539174" y="1023030"/>
-            <a:ext cx="3173600" cy="2800767"/>
+            <a:ext cx="3173600" cy="3139321"/>
           </a:xfrm>
           <a:prstGeom prst="rect">
             <a:avLst/>
@@ -4472,6 +4551,15 @@
           <a:p>
             <a:r>
               <a:rPr lang="nl-NL" sz="1100" dirty="0"/>
+              <a:t>IB	informatiebeveiligingsplan</a:t>
+            </a:r>
+          </a:p>
+          <a:p>
+            <a:endParaRPr lang="nl-NL" sz="1100" dirty="0"/>
+          </a:p>
+          <a:p>
+            <a:r>
+              <a:rPr lang="nl-NL" sz="1100" dirty="0"/>
               <a:t>BL	product </a:t>
             </a:r>
             <a:r>
@@ -4493,15 +4581,12 @@
             </a:r>
           </a:p>
           <a:p>
+            <a:endParaRPr lang="nl-NL" sz="1100" dirty="0"/>
+          </a:p>
+          <a:p>
             <a:r>
               <a:rPr lang="nl-NL" sz="1100" dirty="0"/>
-              <a:t>Test	testplannen</a:t>
-            </a:r>
-          </a:p>
-          <a:p>
-            <a:r>
-              <a:rPr lang="nl-NL" sz="1100" dirty="0"/>
-              <a:t>IB	informatiebeveiligingsplan</a:t>
+              <a:t>TP	testplannen</a:t>
             </a:r>
           </a:p>
         </p:txBody>
@@ -4526,6 +4611,12 @@
           <a:prstGeom prst="foldedCorner">
             <a:avLst/>
           </a:prstGeom>
+          <a:solidFill>
+            <a:schemeClr val="accent2">
+              <a:lumMod val="40000"/>
+              <a:lumOff val="60000"/>
+            </a:schemeClr>
+          </a:solidFill>
         </p:spPr>
         <p:style>
           <a:lnRef idx="1">
@@ -4571,7 +4662,10 @@
             <a:avLst/>
           </a:prstGeom>
           <a:solidFill>
-            <a:srgbClr val="FF33C7"/>
+            <a:schemeClr val="accent4">
+              <a:lumMod val="40000"/>
+              <a:lumOff val="60000"/>
+            </a:schemeClr>
           </a:solidFill>
         </p:spPr>
         <p:style>
@@ -5540,9 +5634,12 @@
 </file>
 
 <file path=customXml/item2.xml><?xml version="1.0" encoding="utf-8"?>
-<p:properties xmlns:p="http://schemas.microsoft.com/office/2006/metadata/properties" xmlns:xsi="http://www.w3.org/2001/XMLSchema-instance" xmlns:pc="http://schemas.microsoft.com/office/infopath/2007/PartnerControls">
-  <documentManagement/>
-</p:properties>
+<?mso-contentType ?>
+<FormTemplates xmlns="http://schemas.microsoft.com/sharepoint/v3/contenttype/forms">
+  <Display>DocumentLibraryForm</Display>
+  <Edit>DocumentLibraryForm</Edit>
+  <New>DocumentLibraryForm</New>
+</FormTemplates>
 </file>
 
 <file path=customXml/item3.xml><?xml version="1.0" encoding="utf-8"?>
@@ -5660,12 +5757,9 @@
 </file>
 
 <file path=customXml/item4.xml><?xml version="1.0" encoding="utf-8"?>
-<?mso-contentType ?>
-<FormTemplates xmlns="http://schemas.microsoft.com/sharepoint/v3/contenttype/forms">
-  <Display>DocumentLibraryForm</Display>
-  <Edit>DocumentLibraryForm</Edit>
-  <New>DocumentLibraryForm</New>
-</FormTemplates>
+<p:properties xmlns:p="http://schemas.microsoft.com/office/2006/metadata/properties" xmlns:xsi="http://www.w3.org/2001/XMLSchema-instance" xmlns:pc="http://schemas.microsoft.com/office/infopath/2007/PartnerControls">
+  <documentManagement/>
+</p:properties>
 </file>
 
 <file path=customXml/itemProps1.xml><?xml version="1.0" encoding="utf-8"?>
@@ -5677,16 +5771,9 @@
 </file>
 
 <file path=customXml/itemProps2.xml><?xml version="1.0" encoding="utf-8"?>
-<ds:datastoreItem xmlns:ds="http://schemas.openxmlformats.org/officeDocument/2006/customXml" ds:itemID="{0F77E14F-9640-4513-8E7C-CB18D1FB76F5}">
+<ds:datastoreItem xmlns:ds="http://schemas.openxmlformats.org/officeDocument/2006/customXml" ds:itemID="{C6E14BCB-FF18-43C2-9B39-2D1FBFF2F7E2}">
   <ds:schemaRefs>
-    <ds:schemaRef ds:uri="http://schemas.openxmlformats.org/package/2006/metadata/core-properties"/>
-    <ds:schemaRef ds:uri="http://purl.org/dc/dcmitype/"/>
-    <ds:schemaRef ds:uri="http://purl.org/dc/elements/1.1/"/>
-    <ds:schemaRef ds:uri="http://schemas.microsoft.com/office/2006/documentManagement/types"/>
-    <ds:schemaRef ds:uri="http://purl.org/dc/terms/"/>
-    <ds:schemaRef ds:uri="http://schemas.microsoft.com/office/infopath/2007/PartnerControls"/>
-    <ds:schemaRef ds:uri="http://schemas.microsoft.com/office/2006/metadata/properties"/>
-    <ds:schemaRef ds:uri="http://www.w3.org/XML/1998/namespace"/>
+    <ds:schemaRef ds:uri="http://schemas.microsoft.com/sharepoint/v3/contenttype/forms"/>
   </ds:schemaRefs>
 </ds:datastoreItem>
 </file>
@@ -5708,9 +5795,16 @@
 </file>
 
 <file path=customXml/itemProps4.xml><?xml version="1.0" encoding="utf-8"?>
-<ds:datastoreItem xmlns:ds="http://schemas.openxmlformats.org/officeDocument/2006/customXml" ds:itemID="{C6E14BCB-FF18-43C2-9B39-2D1FBFF2F7E2}">
+<ds:datastoreItem xmlns:ds="http://schemas.openxmlformats.org/officeDocument/2006/customXml" ds:itemID="{0F77E14F-9640-4513-8E7C-CB18D1FB76F5}">
   <ds:schemaRefs>
-    <ds:schemaRef ds:uri="http://schemas.microsoft.com/sharepoint/v3/contenttype/forms"/>
+    <ds:schemaRef ds:uri="http://schemas.openxmlformats.org/package/2006/metadata/core-properties"/>
+    <ds:schemaRef ds:uri="http://purl.org/dc/dcmitype/"/>
+    <ds:schemaRef ds:uri="http://purl.org/dc/elements/1.1/"/>
+    <ds:schemaRef ds:uri="http://schemas.microsoft.com/office/2006/documentManagement/types"/>
+    <ds:schemaRef ds:uri="http://purl.org/dc/terms/"/>
+    <ds:schemaRef ds:uri="http://schemas.microsoft.com/office/infopath/2007/PartnerControls"/>
+    <ds:schemaRef ds:uri="http://schemas.microsoft.com/office/2006/metadata/properties"/>
+    <ds:schemaRef ds:uri="http://www.w3.org/XML/1998/namespace"/>
   </ds:schemaRefs>
 </ds:datastoreItem>
 </file>
</xml_diff>

<commit_message>
Product en sprint backlog consistent geschreven, conform de Scrumgids (behalve hoofdletters).
Closes #994.
</commit_message>
<xml_diff>
--- a/Content/Images/relaties-tussen-producten.pptx
+++ b/Content/Images/relaties-tussen-producten.pptx
@@ -232,7 +232,7 @@
           <a:p>
             <a:fld id="{350B2457-A054-7D40-BA7B-21B0D0BCC8B3}" type="datetimeFigureOut">
               <a:rPr lang="nl-NL" smtClean="0"/>
-              <a:t>03-02-2022</a:t>
+              <a:t>28-02-2025</a:t>
             </a:fld>
             <a:endParaRPr lang="nl-NL"/>
           </a:p>
@@ -373,7 +373,7 @@
             <a:fld id="{B7EEF894-AF89-4A15-B12A-DB6EE2F8B7F6}" type="datetimeFigureOut">
               <a:rPr lang="nl-NL" smtClean="0"/>
               <a:pPr/>
-              <a:t>03-02-2022</a:t>
+              <a:t>28-02-2025</a:t>
             </a:fld>
             <a:endParaRPr lang="nl-NL"/>
           </a:p>
@@ -3793,7 +3793,7 @@
                   <a:schemeClr val="tx1"/>
                 </a:solidFill>
               </a:rPr>
-              <a:t>BL</a:t>
+              <a:t>PB</a:t>
             </a:r>
           </a:p>
         </p:txBody>
@@ -4560,7 +4560,7 @@
           <a:p>
             <a:r>
               <a:rPr lang="nl-NL" sz="1100" dirty="0"/>
-              <a:t>BL	product </a:t>
+              <a:t>PB	product </a:t>
             </a:r>
             <a:r>
               <a:rPr lang="nl-NL" sz="1100" dirty="0" err="1"/>
@@ -5630,11 +5630,6 @@
 
 <file path=customXml/item1.xml><?xml version="1.0" encoding="utf-8"?>
 <?mso-contentType ?>
-<SharedContentType xmlns="Microsoft.SharePoint.Taxonomy.ContentTypeSync" SourceId="a104d5ce-f540-4606-a78d-e5febbb9402b" ContentTypeId="0x010100CA9CDBB764D01E419D82B5B2D492A06E" PreviousValue="false"/>
-</file>
-
-<file path=customXml/item2.xml><?xml version="1.0" encoding="utf-8"?>
-<?mso-contentType ?>
 <FormTemplates xmlns="http://schemas.microsoft.com/sharepoint/v3/contenttype/forms">
   <Display>DocumentLibraryForm</Display>
   <Edit>DocumentLibraryForm</Edit>
@@ -5642,7 +5637,18 @@
 </FormTemplates>
 </file>
 
+<file path=customXml/item2.xml><?xml version="1.0" encoding="utf-8"?>
+<?mso-contentType ?>
+<SharedContentType xmlns="Microsoft.SharePoint.Taxonomy.ContentTypeSync" SourceId="a104d5ce-f540-4606-a78d-e5febbb9402b" ContentTypeId="0x010100CA9CDBB764D01E419D82B5B2D492A06E" PreviousValue="false"/>
+</file>
+
 <file path=customXml/item3.xml><?xml version="1.0" encoding="utf-8"?>
+<p:properties xmlns:p="http://schemas.microsoft.com/office/2006/metadata/properties" xmlns:xsi="http://www.w3.org/2001/XMLSchema-instance" xmlns:pc="http://schemas.microsoft.com/office/infopath/2007/PartnerControls">
+  <documentManagement/>
+</p:properties>
+</file>
+
+<file path=customXml/item4.xml><?xml version="1.0" encoding="utf-8"?>
 <ct:contentTypeSchema xmlns:ct="http://schemas.microsoft.com/office/2006/metadata/contentType" xmlns:ma="http://schemas.microsoft.com/office/2006/metadata/properties/metaAttributes" ct:_="" ma:_="" ma:contentTypeName="ICTU Blanco Document" ma:contentTypeID="0x010100CA9CDBB764D01E419D82B5B2D492A06E00E64732FD58622849ADF98223EDB743FB" ma:contentTypeVersion="1" ma:contentTypeDescription="Een nieuw document maken." ma:contentTypeScope="" ma:versionID="28f69a9cb16ef1d87fe474606945a2f9">
   <xsd:schema xmlns:xsd="http://www.w3.org/2001/XMLSchema" xmlns:xs="http://www.w3.org/2001/XMLSchema" xmlns:p="http://schemas.microsoft.com/office/2006/metadata/properties" targetNamespace="http://schemas.microsoft.com/office/2006/metadata/properties" ma:root="true" ma:fieldsID="fe1b79ded2d1c66a268d2bc825768432">
     <xsd:element name="properties">
@@ -5756,13 +5762,15 @@
 </ct:contentTypeSchema>
 </file>
 
-<file path=customXml/item4.xml><?xml version="1.0" encoding="utf-8"?>
-<p:properties xmlns:p="http://schemas.microsoft.com/office/2006/metadata/properties" xmlns:xsi="http://www.w3.org/2001/XMLSchema-instance" xmlns:pc="http://schemas.microsoft.com/office/infopath/2007/PartnerControls">
-  <documentManagement/>
-</p:properties>
+<file path=customXml/itemProps1.xml><?xml version="1.0" encoding="utf-8"?>
+<ds:datastoreItem xmlns:ds="http://schemas.openxmlformats.org/officeDocument/2006/customXml" ds:itemID="{C6E14BCB-FF18-43C2-9B39-2D1FBFF2F7E2}">
+  <ds:schemaRefs>
+    <ds:schemaRef ds:uri="http://schemas.microsoft.com/sharepoint/v3/contenttype/forms"/>
+  </ds:schemaRefs>
+</ds:datastoreItem>
 </file>
 
-<file path=customXml/itemProps1.xml><?xml version="1.0" encoding="utf-8"?>
+<file path=customXml/itemProps2.xml><?xml version="1.0" encoding="utf-8"?>
 <ds:datastoreItem xmlns:ds="http://schemas.openxmlformats.org/officeDocument/2006/customXml" ds:itemID="{6DB5B419-F5CF-48E9-BE51-6DA9FADDD3D2}">
   <ds:schemaRefs>
     <ds:schemaRef ds:uri="Microsoft.SharePoint.Taxonomy.ContentTypeSync"/>
@@ -5770,15 +5778,22 @@
 </ds:datastoreItem>
 </file>
 
-<file path=customXml/itemProps2.xml><?xml version="1.0" encoding="utf-8"?>
-<ds:datastoreItem xmlns:ds="http://schemas.openxmlformats.org/officeDocument/2006/customXml" ds:itemID="{C6E14BCB-FF18-43C2-9B39-2D1FBFF2F7E2}">
+<file path=customXml/itemProps3.xml><?xml version="1.0" encoding="utf-8"?>
+<ds:datastoreItem xmlns:ds="http://schemas.openxmlformats.org/officeDocument/2006/customXml" ds:itemID="{0F77E14F-9640-4513-8E7C-CB18D1FB76F5}">
   <ds:schemaRefs>
-    <ds:schemaRef ds:uri="http://schemas.microsoft.com/sharepoint/v3/contenttype/forms"/>
+    <ds:schemaRef ds:uri="http://schemas.openxmlformats.org/package/2006/metadata/core-properties"/>
+    <ds:schemaRef ds:uri="http://purl.org/dc/dcmitype/"/>
+    <ds:schemaRef ds:uri="http://purl.org/dc/elements/1.1/"/>
+    <ds:schemaRef ds:uri="http://schemas.microsoft.com/office/2006/documentManagement/types"/>
+    <ds:schemaRef ds:uri="http://purl.org/dc/terms/"/>
+    <ds:schemaRef ds:uri="http://schemas.microsoft.com/office/infopath/2007/PartnerControls"/>
+    <ds:schemaRef ds:uri="http://schemas.microsoft.com/office/2006/metadata/properties"/>
+    <ds:schemaRef ds:uri="http://www.w3.org/XML/1998/namespace"/>
   </ds:schemaRefs>
 </ds:datastoreItem>
 </file>
 
-<file path=customXml/itemProps3.xml><?xml version="1.0" encoding="utf-8"?>
+<file path=customXml/itemProps4.xml><?xml version="1.0" encoding="utf-8"?>
 <ds:datastoreItem xmlns:ds="http://schemas.openxmlformats.org/officeDocument/2006/customXml" ds:itemID="{4DB5BCB5-1715-4DB7-B20A-25FB39179062}">
   <ds:schemaRefs>
     <ds:schemaRef ds:uri="http://schemas.microsoft.com/office/2006/metadata/contentType"/>
@@ -5792,19 +5807,4 @@
     <ds:schemaRef ds:uri="http://schemas.microsoft.com/office/infopath/2007/PartnerControls"/>
   </ds:schemaRefs>
 </ds:datastoreItem>
-</file>
-
-<file path=customXml/itemProps4.xml><?xml version="1.0" encoding="utf-8"?>
-<ds:datastoreItem xmlns:ds="http://schemas.openxmlformats.org/officeDocument/2006/customXml" ds:itemID="{0F77E14F-9640-4513-8E7C-CB18D1FB76F5}">
-  <ds:schemaRefs>
-    <ds:schemaRef ds:uri="http://schemas.openxmlformats.org/package/2006/metadata/core-properties"/>
-    <ds:schemaRef ds:uri="http://purl.org/dc/dcmitype/"/>
-    <ds:schemaRef ds:uri="http://purl.org/dc/elements/1.1/"/>
-    <ds:schemaRef ds:uri="http://schemas.microsoft.com/office/2006/documentManagement/types"/>
-    <ds:schemaRef ds:uri="http://purl.org/dc/terms/"/>
-    <ds:schemaRef ds:uri="http://schemas.microsoft.com/office/infopath/2007/PartnerControls"/>
-    <ds:schemaRef ds:uri="http://schemas.microsoft.com/office/2006/metadata/properties"/>
-    <ds:schemaRef ds:uri="http://www.w3.org/XML/1998/namespace"/>
-  </ds:schemaRefs>
-</ds:datastoreItem>
 </file>
</xml_diff>

<commit_message>
Product en sprint backlog consistent geschreven, conform de Scrumgids (behalve hoofdletters). (#1006)
Closes #994.
</commit_message>
<xml_diff>
--- a/Content/Images/relaties-tussen-producten.pptx
+++ b/Content/Images/relaties-tussen-producten.pptx
@@ -232,7 +232,7 @@
           <a:p>
             <a:fld id="{350B2457-A054-7D40-BA7B-21B0D0BCC8B3}" type="datetimeFigureOut">
               <a:rPr lang="nl-NL" smtClean="0"/>
-              <a:t>03-02-2022</a:t>
+              <a:t>28-02-2025</a:t>
             </a:fld>
             <a:endParaRPr lang="nl-NL"/>
           </a:p>
@@ -373,7 +373,7 @@
             <a:fld id="{B7EEF894-AF89-4A15-B12A-DB6EE2F8B7F6}" type="datetimeFigureOut">
               <a:rPr lang="nl-NL" smtClean="0"/>
               <a:pPr/>
-              <a:t>03-02-2022</a:t>
+              <a:t>28-02-2025</a:t>
             </a:fld>
             <a:endParaRPr lang="nl-NL"/>
           </a:p>
@@ -3793,7 +3793,7 @@
                   <a:schemeClr val="tx1"/>
                 </a:solidFill>
               </a:rPr>
-              <a:t>BL</a:t>
+              <a:t>PB</a:t>
             </a:r>
           </a:p>
         </p:txBody>
@@ -4560,7 +4560,7 @@
           <a:p>
             <a:r>
               <a:rPr lang="nl-NL" sz="1100" dirty="0"/>
-              <a:t>BL	product </a:t>
+              <a:t>PB	product </a:t>
             </a:r>
             <a:r>
               <a:rPr lang="nl-NL" sz="1100" dirty="0" err="1"/>
@@ -5630,11 +5630,6 @@
 
 <file path=customXml/item1.xml><?xml version="1.0" encoding="utf-8"?>
 <?mso-contentType ?>
-<SharedContentType xmlns="Microsoft.SharePoint.Taxonomy.ContentTypeSync" SourceId="a104d5ce-f540-4606-a78d-e5febbb9402b" ContentTypeId="0x010100CA9CDBB764D01E419D82B5B2D492A06E" PreviousValue="false"/>
-</file>
-
-<file path=customXml/item2.xml><?xml version="1.0" encoding="utf-8"?>
-<?mso-contentType ?>
 <FormTemplates xmlns="http://schemas.microsoft.com/sharepoint/v3/contenttype/forms">
   <Display>DocumentLibraryForm</Display>
   <Edit>DocumentLibraryForm</Edit>
@@ -5642,7 +5637,18 @@
 </FormTemplates>
 </file>
 
+<file path=customXml/item2.xml><?xml version="1.0" encoding="utf-8"?>
+<?mso-contentType ?>
+<SharedContentType xmlns="Microsoft.SharePoint.Taxonomy.ContentTypeSync" SourceId="a104d5ce-f540-4606-a78d-e5febbb9402b" ContentTypeId="0x010100CA9CDBB764D01E419D82B5B2D492A06E" PreviousValue="false"/>
+</file>
+
 <file path=customXml/item3.xml><?xml version="1.0" encoding="utf-8"?>
+<p:properties xmlns:p="http://schemas.microsoft.com/office/2006/metadata/properties" xmlns:xsi="http://www.w3.org/2001/XMLSchema-instance" xmlns:pc="http://schemas.microsoft.com/office/infopath/2007/PartnerControls">
+  <documentManagement/>
+</p:properties>
+</file>
+
+<file path=customXml/item4.xml><?xml version="1.0" encoding="utf-8"?>
 <ct:contentTypeSchema xmlns:ct="http://schemas.microsoft.com/office/2006/metadata/contentType" xmlns:ma="http://schemas.microsoft.com/office/2006/metadata/properties/metaAttributes" ct:_="" ma:_="" ma:contentTypeName="ICTU Blanco Document" ma:contentTypeID="0x010100CA9CDBB764D01E419D82B5B2D492A06E00E64732FD58622849ADF98223EDB743FB" ma:contentTypeVersion="1" ma:contentTypeDescription="Een nieuw document maken." ma:contentTypeScope="" ma:versionID="28f69a9cb16ef1d87fe474606945a2f9">
   <xsd:schema xmlns:xsd="http://www.w3.org/2001/XMLSchema" xmlns:xs="http://www.w3.org/2001/XMLSchema" xmlns:p="http://schemas.microsoft.com/office/2006/metadata/properties" targetNamespace="http://schemas.microsoft.com/office/2006/metadata/properties" ma:root="true" ma:fieldsID="fe1b79ded2d1c66a268d2bc825768432">
     <xsd:element name="properties">
@@ -5756,13 +5762,15 @@
 </ct:contentTypeSchema>
 </file>
 
-<file path=customXml/item4.xml><?xml version="1.0" encoding="utf-8"?>
-<p:properties xmlns:p="http://schemas.microsoft.com/office/2006/metadata/properties" xmlns:xsi="http://www.w3.org/2001/XMLSchema-instance" xmlns:pc="http://schemas.microsoft.com/office/infopath/2007/PartnerControls">
-  <documentManagement/>
-</p:properties>
+<file path=customXml/itemProps1.xml><?xml version="1.0" encoding="utf-8"?>
+<ds:datastoreItem xmlns:ds="http://schemas.openxmlformats.org/officeDocument/2006/customXml" ds:itemID="{C6E14BCB-FF18-43C2-9B39-2D1FBFF2F7E2}">
+  <ds:schemaRefs>
+    <ds:schemaRef ds:uri="http://schemas.microsoft.com/sharepoint/v3/contenttype/forms"/>
+  </ds:schemaRefs>
+</ds:datastoreItem>
 </file>
 
-<file path=customXml/itemProps1.xml><?xml version="1.0" encoding="utf-8"?>
+<file path=customXml/itemProps2.xml><?xml version="1.0" encoding="utf-8"?>
 <ds:datastoreItem xmlns:ds="http://schemas.openxmlformats.org/officeDocument/2006/customXml" ds:itemID="{6DB5B419-F5CF-48E9-BE51-6DA9FADDD3D2}">
   <ds:schemaRefs>
     <ds:schemaRef ds:uri="Microsoft.SharePoint.Taxonomy.ContentTypeSync"/>
@@ -5770,15 +5778,22 @@
 </ds:datastoreItem>
 </file>
 
-<file path=customXml/itemProps2.xml><?xml version="1.0" encoding="utf-8"?>
-<ds:datastoreItem xmlns:ds="http://schemas.openxmlformats.org/officeDocument/2006/customXml" ds:itemID="{C6E14BCB-FF18-43C2-9B39-2D1FBFF2F7E2}">
+<file path=customXml/itemProps3.xml><?xml version="1.0" encoding="utf-8"?>
+<ds:datastoreItem xmlns:ds="http://schemas.openxmlformats.org/officeDocument/2006/customXml" ds:itemID="{0F77E14F-9640-4513-8E7C-CB18D1FB76F5}">
   <ds:schemaRefs>
-    <ds:schemaRef ds:uri="http://schemas.microsoft.com/sharepoint/v3/contenttype/forms"/>
+    <ds:schemaRef ds:uri="http://schemas.openxmlformats.org/package/2006/metadata/core-properties"/>
+    <ds:schemaRef ds:uri="http://purl.org/dc/dcmitype/"/>
+    <ds:schemaRef ds:uri="http://purl.org/dc/elements/1.1/"/>
+    <ds:schemaRef ds:uri="http://schemas.microsoft.com/office/2006/documentManagement/types"/>
+    <ds:schemaRef ds:uri="http://purl.org/dc/terms/"/>
+    <ds:schemaRef ds:uri="http://schemas.microsoft.com/office/infopath/2007/PartnerControls"/>
+    <ds:schemaRef ds:uri="http://schemas.microsoft.com/office/2006/metadata/properties"/>
+    <ds:schemaRef ds:uri="http://www.w3.org/XML/1998/namespace"/>
   </ds:schemaRefs>
 </ds:datastoreItem>
 </file>
 
-<file path=customXml/itemProps3.xml><?xml version="1.0" encoding="utf-8"?>
+<file path=customXml/itemProps4.xml><?xml version="1.0" encoding="utf-8"?>
 <ds:datastoreItem xmlns:ds="http://schemas.openxmlformats.org/officeDocument/2006/customXml" ds:itemID="{4DB5BCB5-1715-4DB7-B20A-25FB39179062}">
   <ds:schemaRefs>
     <ds:schemaRef ds:uri="http://schemas.microsoft.com/office/2006/metadata/contentType"/>
@@ -5792,19 +5807,4 @@
     <ds:schemaRef ds:uri="http://schemas.microsoft.com/office/infopath/2007/PartnerControls"/>
   </ds:schemaRefs>
 </ds:datastoreItem>
-</file>
-
-<file path=customXml/itemProps4.xml><?xml version="1.0" encoding="utf-8"?>
-<ds:datastoreItem xmlns:ds="http://schemas.openxmlformats.org/officeDocument/2006/customXml" ds:itemID="{0F77E14F-9640-4513-8E7C-CB18D1FB76F5}">
-  <ds:schemaRefs>
-    <ds:schemaRef ds:uri="http://schemas.openxmlformats.org/package/2006/metadata/core-properties"/>
-    <ds:schemaRef ds:uri="http://purl.org/dc/dcmitype/"/>
-    <ds:schemaRef ds:uri="http://purl.org/dc/elements/1.1/"/>
-    <ds:schemaRef ds:uri="http://schemas.microsoft.com/office/2006/documentManagement/types"/>
-    <ds:schemaRef ds:uri="http://purl.org/dc/terms/"/>
-    <ds:schemaRef ds:uri="http://schemas.microsoft.com/office/infopath/2007/PartnerControls"/>
-    <ds:schemaRef ds:uri="http://schemas.microsoft.com/office/2006/metadata/properties"/>
-    <ds:schemaRef ds:uri="http://www.w3.org/XML/1998/namespace"/>
-  </ds:schemaRefs>
-</ds:datastoreItem>
 </file>
</xml_diff>

<commit_message>
Gebruik DPIA in plaats van PIA.
Closes #1004.
</commit_message>
<xml_diff>
--- a/Content/Images/relaties-tussen-producten.pptx
+++ b/Content/Images/relaties-tussen-producten.pptx
@@ -232,7 +232,7 @@
           <a:p>
             <a:fld id="{350B2457-A054-7D40-BA7B-21B0D0BCC8B3}" type="datetimeFigureOut">
               <a:rPr lang="nl-NL" smtClean="0"/>
-              <a:t>28-02-2025</a:t>
+              <a:t>24-03-2025</a:t>
             </a:fld>
             <a:endParaRPr lang="nl-NL"/>
           </a:p>
@@ -373,7 +373,7 @@
             <a:fld id="{B7EEF894-AF89-4A15-B12A-DB6EE2F8B7F6}" type="datetimeFigureOut">
               <a:rPr lang="nl-NL" smtClean="0"/>
               <a:pPr/>
-              <a:t>28-02-2025</a:t>
+              <a:t>24-03-2025</a:t>
             </a:fld>
             <a:endParaRPr lang="nl-NL"/>
           </a:p>
@@ -3450,7 +3450,7 @@
                   <a:schemeClr val="tx1"/>
                 </a:solidFill>
               </a:rPr>
-              <a:t>PIA</a:t>
+              <a:t>DPIA</a:t>
             </a:r>
           </a:p>
         </p:txBody>
@@ -4518,7 +4518,15 @@
           <a:p>
             <a:r>
               <a:rPr lang="nl-NL" sz="1100" dirty="0"/>
-              <a:t>PIA	privacy impact analyse</a:t>
+              <a:t>DPIA	data </a:t>
+            </a:r>
+            <a:r>
+              <a:rPr lang="nl-NL" sz="1100" dirty="0" err="1"/>
+              <a:t>protection</a:t>
+            </a:r>
+            <a:r>
+              <a:rPr lang="nl-NL" sz="1100" dirty="0"/>
+              <a:t> impact analyse</a:t>
             </a:r>
           </a:p>
           <a:p>
@@ -5630,6 +5638,11 @@
 
 <file path=customXml/item1.xml><?xml version="1.0" encoding="utf-8"?>
 <?mso-contentType ?>
+<SharedContentType xmlns="Microsoft.SharePoint.Taxonomy.ContentTypeSync" SourceId="a104d5ce-f540-4606-a78d-e5febbb9402b" ContentTypeId="0x010100CA9CDBB764D01E419D82B5B2D492A06E" PreviousValue="false"/>
+</file>
+
+<file path=customXml/item2.xml><?xml version="1.0" encoding="utf-8"?>
+<?mso-contentType ?>
 <FormTemplates xmlns="http://schemas.microsoft.com/sharepoint/v3/contenttype/forms">
   <Display>DocumentLibraryForm</Display>
   <Edit>DocumentLibraryForm</Edit>
@@ -5637,18 +5650,7 @@
 </FormTemplates>
 </file>
 
-<file path=customXml/item2.xml><?xml version="1.0" encoding="utf-8"?>
-<?mso-contentType ?>
-<SharedContentType xmlns="Microsoft.SharePoint.Taxonomy.ContentTypeSync" SourceId="a104d5ce-f540-4606-a78d-e5febbb9402b" ContentTypeId="0x010100CA9CDBB764D01E419D82B5B2D492A06E" PreviousValue="false"/>
-</file>
-
 <file path=customXml/item3.xml><?xml version="1.0" encoding="utf-8"?>
-<p:properties xmlns:p="http://schemas.microsoft.com/office/2006/metadata/properties" xmlns:xsi="http://www.w3.org/2001/XMLSchema-instance" xmlns:pc="http://schemas.microsoft.com/office/infopath/2007/PartnerControls">
-  <documentManagement/>
-</p:properties>
-</file>
-
-<file path=customXml/item4.xml><?xml version="1.0" encoding="utf-8"?>
 <ct:contentTypeSchema xmlns:ct="http://schemas.microsoft.com/office/2006/metadata/contentType" xmlns:ma="http://schemas.microsoft.com/office/2006/metadata/properties/metaAttributes" ct:_="" ma:_="" ma:contentTypeName="ICTU Blanco Document" ma:contentTypeID="0x010100CA9CDBB764D01E419D82B5B2D492A06E00E64732FD58622849ADF98223EDB743FB" ma:contentTypeVersion="1" ma:contentTypeDescription="Een nieuw document maken." ma:contentTypeScope="" ma:versionID="28f69a9cb16ef1d87fe474606945a2f9">
   <xsd:schema xmlns:xsd="http://www.w3.org/2001/XMLSchema" xmlns:xs="http://www.w3.org/2001/XMLSchema" xmlns:p="http://schemas.microsoft.com/office/2006/metadata/properties" targetNamespace="http://schemas.microsoft.com/office/2006/metadata/properties" ma:root="true" ma:fieldsID="fe1b79ded2d1c66a268d2bc825768432">
     <xsd:element name="properties">
@@ -5762,7 +5764,21 @@
 </ct:contentTypeSchema>
 </file>
 
+<file path=customXml/item4.xml><?xml version="1.0" encoding="utf-8"?>
+<p:properties xmlns:p="http://schemas.microsoft.com/office/2006/metadata/properties" xmlns:xsi="http://www.w3.org/2001/XMLSchema-instance" xmlns:pc="http://schemas.microsoft.com/office/infopath/2007/PartnerControls">
+  <documentManagement/>
+</p:properties>
+</file>
+
 <file path=customXml/itemProps1.xml><?xml version="1.0" encoding="utf-8"?>
+<ds:datastoreItem xmlns:ds="http://schemas.openxmlformats.org/officeDocument/2006/customXml" ds:itemID="{6DB5B419-F5CF-48E9-BE51-6DA9FADDD3D2}">
+  <ds:schemaRefs>
+    <ds:schemaRef ds:uri="Microsoft.SharePoint.Taxonomy.ContentTypeSync"/>
+  </ds:schemaRefs>
+</ds:datastoreItem>
+</file>
+
+<file path=customXml/itemProps2.xml><?xml version="1.0" encoding="utf-8"?>
 <ds:datastoreItem xmlns:ds="http://schemas.openxmlformats.org/officeDocument/2006/customXml" ds:itemID="{C6E14BCB-FF18-43C2-9B39-2D1FBFF2F7E2}">
   <ds:schemaRefs>
     <ds:schemaRef ds:uri="http://schemas.microsoft.com/sharepoint/v3/contenttype/forms"/>
@@ -5770,30 +5786,7 @@
 </ds:datastoreItem>
 </file>
 
-<file path=customXml/itemProps2.xml><?xml version="1.0" encoding="utf-8"?>
-<ds:datastoreItem xmlns:ds="http://schemas.openxmlformats.org/officeDocument/2006/customXml" ds:itemID="{6DB5B419-F5CF-48E9-BE51-6DA9FADDD3D2}">
-  <ds:schemaRefs>
-    <ds:schemaRef ds:uri="Microsoft.SharePoint.Taxonomy.ContentTypeSync"/>
-  </ds:schemaRefs>
-</ds:datastoreItem>
-</file>
-
 <file path=customXml/itemProps3.xml><?xml version="1.0" encoding="utf-8"?>
-<ds:datastoreItem xmlns:ds="http://schemas.openxmlformats.org/officeDocument/2006/customXml" ds:itemID="{0F77E14F-9640-4513-8E7C-CB18D1FB76F5}">
-  <ds:schemaRefs>
-    <ds:schemaRef ds:uri="http://schemas.openxmlformats.org/package/2006/metadata/core-properties"/>
-    <ds:schemaRef ds:uri="http://purl.org/dc/dcmitype/"/>
-    <ds:schemaRef ds:uri="http://purl.org/dc/elements/1.1/"/>
-    <ds:schemaRef ds:uri="http://schemas.microsoft.com/office/2006/documentManagement/types"/>
-    <ds:schemaRef ds:uri="http://purl.org/dc/terms/"/>
-    <ds:schemaRef ds:uri="http://schemas.microsoft.com/office/infopath/2007/PartnerControls"/>
-    <ds:schemaRef ds:uri="http://schemas.microsoft.com/office/2006/metadata/properties"/>
-    <ds:schemaRef ds:uri="http://www.w3.org/XML/1998/namespace"/>
-  </ds:schemaRefs>
-</ds:datastoreItem>
-</file>
-
-<file path=customXml/itemProps4.xml><?xml version="1.0" encoding="utf-8"?>
 <ds:datastoreItem xmlns:ds="http://schemas.openxmlformats.org/officeDocument/2006/customXml" ds:itemID="{4DB5BCB5-1715-4DB7-B20A-25FB39179062}">
   <ds:schemaRefs>
     <ds:schemaRef ds:uri="http://schemas.microsoft.com/office/2006/metadata/contentType"/>
@@ -5807,4 +5800,19 @@
     <ds:schemaRef ds:uri="http://schemas.microsoft.com/office/infopath/2007/PartnerControls"/>
   </ds:schemaRefs>
 </ds:datastoreItem>
+</file>
+
+<file path=customXml/itemProps4.xml><?xml version="1.0" encoding="utf-8"?>
+<ds:datastoreItem xmlns:ds="http://schemas.openxmlformats.org/officeDocument/2006/customXml" ds:itemID="{0F77E14F-9640-4513-8E7C-CB18D1FB76F5}">
+  <ds:schemaRefs>
+    <ds:schemaRef ds:uri="http://schemas.openxmlformats.org/package/2006/metadata/core-properties"/>
+    <ds:schemaRef ds:uri="http://purl.org/dc/dcmitype/"/>
+    <ds:schemaRef ds:uri="http://purl.org/dc/elements/1.1/"/>
+    <ds:schemaRef ds:uri="http://schemas.microsoft.com/office/2006/documentManagement/types"/>
+    <ds:schemaRef ds:uri="http://purl.org/dc/terms/"/>
+    <ds:schemaRef ds:uri="http://schemas.microsoft.com/office/infopath/2007/PartnerControls"/>
+    <ds:schemaRef ds:uri="http://schemas.microsoft.com/office/2006/metadata/properties"/>
+    <ds:schemaRef ds:uri="http://www.w3.org/XML/1998/namespace"/>
+  </ds:schemaRefs>
+</ds:datastoreItem>
 </file>
</xml_diff>

<commit_message>
Gebruik DPIA in plaats van PIA. (#1024)
Closes #1004.
</commit_message>
<xml_diff>
--- a/Content/Images/relaties-tussen-producten.pptx
+++ b/Content/Images/relaties-tussen-producten.pptx
@@ -232,7 +232,7 @@
           <a:p>
             <a:fld id="{350B2457-A054-7D40-BA7B-21B0D0BCC8B3}" type="datetimeFigureOut">
               <a:rPr lang="nl-NL" smtClean="0"/>
-              <a:t>28-02-2025</a:t>
+              <a:t>24-03-2025</a:t>
             </a:fld>
             <a:endParaRPr lang="nl-NL"/>
           </a:p>
@@ -373,7 +373,7 @@
             <a:fld id="{B7EEF894-AF89-4A15-B12A-DB6EE2F8B7F6}" type="datetimeFigureOut">
               <a:rPr lang="nl-NL" smtClean="0"/>
               <a:pPr/>
-              <a:t>28-02-2025</a:t>
+              <a:t>24-03-2025</a:t>
             </a:fld>
             <a:endParaRPr lang="nl-NL"/>
           </a:p>
@@ -3450,7 +3450,7 @@
                   <a:schemeClr val="tx1"/>
                 </a:solidFill>
               </a:rPr>
-              <a:t>PIA</a:t>
+              <a:t>DPIA</a:t>
             </a:r>
           </a:p>
         </p:txBody>
@@ -4518,7 +4518,15 @@
           <a:p>
             <a:r>
               <a:rPr lang="nl-NL" sz="1100" dirty="0"/>
-              <a:t>PIA	privacy impact analyse</a:t>
+              <a:t>DPIA	data </a:t>
+            </a:r>
+            <a:r>
+              <a:rPr lang="nl-NL" sz="1100" dirty="0" err="1"/>
+              <a:t>protection</a:t>
+            </a:r>
+            <a:r>
+              <a:rPr lang="nl-NL" sz="1100" dirty="0"/>
+              <a:t> impact analyse</a:t>
             </a:r>
           </a:p>
           <a:p>
@@ -5630,6 +5638,11 @@
 
 <file path=customXml/item1.xml><?xml version="1.0" encoding="utf-8"?>
 <?mso-contentType ?>
+<SharedContentType xmlns="Microsoft.SharePoint.Taxonomy.ContentTypeSync" SourceId="a104d5ce-f540-4606-a78d-e5febbb9402b" ContentTypeId="0x010100CA9CDBB764D01E419D82B5B2D492A06E" PreviousValue="false"/>
+</file>
+
+<file path=customXml/item2.xml><?xml version="1.0" encoding="utf-8"?>
+<?mso-contentType ?>
 <FormTemplates xmlns="http://schemas.microsoft.com/sharepoint/v3/contenttype/forms">
   <Display>DocumentLibraryForm</Display>
   <Edit>DocumentLibraryForm</Edit>
@@ -5637,18 +5650,7 @@
 </FormTemplates>
 </file>
 
-<file path=customXml/item2.xml><?xml version="1.0" encoding="utf-8"?>
-<?mso-contentType ?>
-<SharedContentType xmlns="Microsoft.SharePoint.Taxonomy.ContentTypeSync" SourceId="a104d5ce-f540-4606-a78d-e5febbb9402b" ContentTypeId="0x010100CA9CDBB764D01E419D82B5B2D492A06E" PreviousValue="false"/>
-</file>
-
 <file path=customXml/item3.xml><?xml version="1.0" encoding="utf-8"?>
-<p:properties xmlns:p="http://schemas.microsoft.com/office/2006/metadata/properties" xmlns:xsi="http://www.w3.org/2001/XMLSchema-instance" xmlns:pc="http://schemas.microsoft.com/office/infopath/2007/PartnerControls">
-  <documentManagement/>
-</p:properties>
-</file>
-
-<file path=customXml/item4.xml><?xml version="1.0" encoding="utf-8"?>
 <ct:contentTypeSchema xmlns:ct="http://schemas.microsoft.com/office/2006/metadata/contentType" xmlns:ma="http://schemas.microsoft.com/office/2006/metadata/properties/metaAttributes" ct:_="" ma:_="" ma:contentTypeName="ICTU Blanco Document" ma:contentTypeID="0x010100CA9CDBB764D01E419D82B5B2D492A06E00E64732FD58622849ADF98223EDB743FB" ma:contentTypeVersion="1" ma:contentTypeDescription="Een nieuw document maken." ma:contentTypeScope="" ma:versionID="28f69a9cb16ef1d87fe474606945a2f9">
   <xsd:schema xmlns:xsd="http://www.w3.org/2001/XMLSchema" xmlns:xs="http://www.w3.org/2001/XMLSchema" xmlns:p="http://schemas.microsoft.com/office/2006/metadata/properties" targetNamespace="http://schemas.microsoft.com/office/2006/metadata/properties" ma:root="true" ma:fieldsID="fe1b79ded2d1c66a268d2bc825768432">
     <xsd:element name="properties">
@@ -5762,7 +5764,21 @@
 </ct:contentTypeSchema>
 </file>
 
+<file path=customXml/item4.xml><?xml version="1.0" encoding="utf-8"?>
+<p:properties xmlns:p="http://schemas.microsoft.com/office/2006/metadata/properties" xmlns:xsi="http://www.w3.org/2001/XMLSchema-instance" xmlns:pc="http://schemas.microsoft.com/office/infopath/2007/PartnerControls">
+  <documentManagement/>
+</p:properties>
+</file>
+
 <file path=customXml/itemProps1.xml><?xml version="1.0" encoding="utf-8"?>
+<ds:datastoreItem xmlns:ds="http://schemas.openxmlformats.org/officeDocument/2006/customXml" ds:itemID="{6DB5B419-F5CF-48E9-BE51-6DA9FADDD3D2}">
+  <ds:schemaRefs>
+    <ds:schemaRef ds:uri="Microsoft.SharePoint.Taxonomy.ContentTypeSync"/>
+  </ds:schemaRefs>
+</ds:datastoreItem>
+</file>
+
+<file path=customXml/itemProps2.xml><?xml version="1.0" encoding="utf-8"?>
 <ds:datastoreItem xmlns:ds="http://schemas.openxmlformats.org/officeDocument/2006/customXml" ds:itemID="{C6E14BCB-FF18-43C2-9B39-2D1FBFF2F7E2}">
   <ds:schemaRefs>
     <ds:schemaRef ds:uri="http://schemas.microsoft.com/sharepoint/v3/contenttype/forms"/>
@@ -5770,30 +5786,7 @@
 </ds:datastoreItem>
 </file>
 
-<file path=customXml/itemProps2.xml><?xml version="1.0" encoding="utf-8"?>
-<ds:datastoreItem xmlns:ds="http://schemas.openxmlformats.org/officeDocument/2006/customXml" ds:itemID="{6DB5B419-F5CF-48E9-BE51-6DA9FADDD3D2}">
-  <ds:schemaRefs>
-    <ds:schemaRef ds:uri="Microsoft.SharePoint.Taxonomy.ContentTypeSync"/>
-  </ds:schemaRefs>
-</ds:datastoreItem>
-</file>
-
 <file path=customXml/itemProps3.xml><?xml version="1.0" encoding="utf-8"?>
-<ds:datastoreItem xmlns:ds="http://schemas.openxmlformats.org/officeDocument/2006/customXml" ds:itemID="{0F77E14F-9640-4513-8E7C-CB18D1FB76F5}">
-  <ds:schemaRefs>
-    <ds:schemaRef ds:uri="http://schemas.openxmlformats.org/package/2006/metadata/core-properties"/>
-    <ds:schemaRef ds:uri="http://purl.org/dc/dcmitype/"/>
-    <ds:schemaRef ds:uri="http://purl.org/dc/elements/1.1/"/>
-    <ds:schemaRef ds:uri="http://schemas.microsoft.com/office/2006/documentManagement/types"/>
-    <ds:schemaRef ds:uri="http://purl.org/dc/terms/"/>
-    <ds:schemaRef ds:uri="http://schemas.microsoft.com/office/infopath/2007/PartnerControls"/>
-    <ds:schemaRef ds:uri="http://schemas.microsoft.com/office/2006/metadata/properties"/>
-    <ds:schemaRef ds:uri="http://www.w3.org/XML/1998/namespace"/>
-  </ds:schemaRefs>
-</ds:datastoreItem>
-</file>
-
-<file path=customXml/itemProps4.xml><?xml version="1.0" encoding="utf-8"?>
 <ds:datastoreItem xmlns:ds="http://schemas.openxmlformats.org/officeDocument/2006/customXml" ds:itemID="{4DB5BCB5-1715-4DB7-B20A-25FB39179062}">
   <ds:schemaRefs>
     <ds:schemaRef ds:uri="http://schemas.microsoft.com/office/2006/metadata/contentType"/>
@@ -5807,4 +5800,19 @@
     <ds:schemaRef ds:uri="http://schemas.microsoft.com/office/infopath/2007/PartnerControls"/>
   </ds:schemaRefs>
 </ds:datastoreItem>
+</file>
+
+<file path=customXml/itemProps4.xml><?xml version="1.0" encoding="utf-8"?>
+<ds:datastoreItem xmlns:ds="http://schemas.openxmlformats.org/officeDocument/2006/customXml" ds:itemID="{0F77E14F-9640-4513-8E7C-CB18D1FB76F5}">
+  <ds:schemaRefs>
+    <ds:schemaRef ds:uri="http://schemas.openxmlformats.org/package/2006/metadata/core-properties"/>
+    <ds:schemaRef ds:uri="http://purl.org/dc/dcmitype/"/>
+    <ds:schemaRef ds:uri="http://purl.org/dc/elements/1.1/"/>
+    <ds:schemaRef ds:uri="http://schemas.microsoft.com/office/2006/documentManagement/types"/>
+    <ds:schemaRef ds:uri="http://purl.org/dc/terms/"/>
+    <ds:schemaRef ds:uri="http://schemas.microsoft.com/office/infopath/2007/PartnerControls"/>
+    <ds:schemaRef ds:uri="http://schemas.microsoft.com/office/2006/metadata/properties"/>
+    <ds:schemaRef ds:uri="http://www.w3.org/XML/1998/namespace"/>
+  </ds:schemaRefs>
+</ds:datastoreItem>
 </file>
</xml_diff>